<commit_message>
Update ghost chaser QR codes
</commit_message>
<xml_diff>
--- a/content/rooms/ghost-chasers/fold-back-qr.pptx
+++ b/content/rooms/ghost-chasers/fold-back-qr.pptx
@@ -5573,68 +5573,20 @@
       </p:grpSpPr>
       <p:pic>
         <p:nvPicPr>
-          <p:cNvPr id="61" name="Google Shape;61;p14"/>
-          <p:cNvPicPr preferRelativeResize="0"/>
-          <p:nvPr/>
-        </p:nvPicPr>
-        <p:blipFill rotWithShape="1">
-          <a:blip r:embed="rId3">
-            <a:alphaModFix/>
-          </a:blip>
-          <a:srcRect r="50345"/>
-          <a:stretch/>
-        </p:blipFill>
-        <p:spPr>
-          <a:xfrm>
-            <a:off x="7327875" y="1600200"/>
-            <a:ext cx="1816125" cy="3657600"/>
-          </a:xfrm>
-          <a:prstGeom prst="rect">
-            <a:avLst/>
-          </a:prstGeom>
-          <a:noFill/>
-          <a:ln>
-            <a:noFill/>
-          </a:ln>
-        </p:spPr>
-      </p:pic>
-      <p:pic>
-        <p:nvPicPr>
-          <p:cNvPr id="62" name="Google Shape;62;p14"/>
-          <p:cNvPicPr preferRelativeResize="0"/>
-          <p:nvPr/>
-        </p:nvPicPr>
-        <p:blipFill rotWithShape="1">
-          <a:blip r:embed="rId3">
-            <a:alphaModFix/>
-          </a:blip>
-          <a:srcRect l="49655"/>
-          <a:stretch/>
-        </p:blipFill>
-        <p:spPr>
-          <a:xfrm>
-            <a:off x="0" y="1600200"/>
-            <a:ext cx="1841475" cy="3657600"/>
-          </a:xfrm>
-          <a:prstGeom prst="rect">
-            <a:avLst/>
-          </a:prstGeom>
-          <a:noFill/>
-          <a:ln>
-            <a:noFill/>
-          </a:ln>
-        </p:spPr>
-      </p:pic>
-      <p:pic>
-        <p:nvPicPr>
-          <p:cNvPr id="63" name="Google Shape;63;p14"/>
-          <p:cNvPicPr preferRelativeResize="0"/>
+          <p:cNvPr id="9" name="Picture 8" descr="A qr code with a few squares&#10;&#10;Description automatically generated">
+            <a:extLst>
+              <a:ext uri="{FF2B5EF4-FFF2-40B4-BE49-F238E27FC236}">
+                <a16:creationId xmlns:a16="http://schemas.microsoft.com/office/drawing/2014/main" id="{6607F446-43E3-5BD9-BCA3-ACC4887A179C}"/>
+              </a:ext>
+            </a:extLst>
+          </p:cNvPr>
+          <p:cNvPicPr>
+            <a:picLocks/>
+          </p:cNvPicPr>
           <p:nvPr/>
         </p:nvPicPr>
         <p:blipFill>
-          <a:blip r:embed="rId4">
-            <a:alphaModFix/>
-          </a:blip>
+          <a:blip r:embed="rId3"/>
           <a:stretch>
             <a:fillRect/>
           </a:stretch>
@@ -5647,10 +5599,64 @@
           <a:prstGeom prst="rect">
             <a:avLst/>
           </a:prstGeom>
-          <a:noFill/>
-          <a:ln>
-            <a:noFill/>
-          </a:ln>
+        </p:spPr>
+      </p:pic>
+      <p:pic>
+        <p:nvPicPr>
+          <p:cNvPr id="6" name="Picture 5" descr="A qr code with black squares&#10;&#10;Description automatically generated">
+            <a:extLst>
+              <a:ext uri="{FF2B5EF4-FFF2-40B4-BE49-F238E27FC236}">
+                <a16:creationId xmlns:a16="http://schemas.microsoft.com/office/drawing/2014/main" id="{790F5224-7B45-9F83-7BEB-CDA832ADC8E3}"/>
+              </a:ext>
+            </a:extLst>
+          </p:cNvPr>
+          <p:cNvPicPr>
+            <a:picLocks noChangeAspect="1"/>
+          </p:cNvPicPr>
+          <p:nvPr/>
+        </p:nvPicPr>
+        <p:blipFill>
+          <a:blip r:embed="rId4"/>
+          <a:srcRect l="-2" r="49958"/>
+          <a:stretch/>
+        </p:blipFill>
+        <p:spPr>
+          <a:xfrm>
+            <a:off x="7313625" y="1600200"/>
+            <a:ext cx="1830375" cy="3657600"/>
+          </a:xfrm>
+          <a:prstGeom prst="rect">
+            <a:avLst/>
+          </a:prstGeom>
+        </p:spPr>
+      </p:pic>
+      <p:pic>
+        <p:nvPicPr>
+          <p:cNvPr id="7" name="Picture 6" descr="A qr code with black squares&#10;&#10;Description automatically generated">
+            <a:extLst>
+              <a:ext uri="{FF2B5EF4-FFF2-40B4-BE49-F238E27FC236}">
+                <a16:creationId xmlns:a16="http://schemas.microsoft.com/office/drawing/2014/main" id="{ED19D4B0-41A2-04FE-D917-B491E4C7D664}"/>
+              </a:ext>
+            </a:extLst>
+          </p:cNvPr>
+          <p:cNvPicPr>
+            <a:picLocks noChangeAspect="1"/>
+          </p:cNvPicPr>
+          <p:nvPr/>
+        </p:nvPicPr>
+        <p:blipFill>
+          <a:blip r:embed="rId4"/>
+          <a:srcRect l="45679" r="-1"/>
+          <a:stretch/>
+        </p:blipFill>
+        <p:spPr>
+          <a:xfrm>
+            <a:off x="0" y="1600200"/>
+            <a:ext cx="1980477" cy="3657600"/>
+          </a:xfrm>
+          <a:prstGeom prst="rect">
+            <a:avLst/>
+          </a:prstGeom>
         </p:spPr>
       </p:pic>
       <p:sp>
@@ -5719,7 +5725,7 @@
         </p:nvSpPr>
         <p:spPr>
           <a:xfrm>
-            <a:off x="-1816125" y="1600200"/>
+            <a:off x="-1677123" y="1600200"/>
             <a:ext cx="3657600" cy="3657600"/>
           </a:xfrm>
           <a:prstGeom prst="rect">
@@ -5771,7 +5777,7 @@
         </p:nvSpPr>
         <p:spPr>
           <a:xfrm>
-            <a:off x="7327875" y="1600200"/>
+            <a:off x="7313625" y="1600200"/>
             <a:ext cx="3657600" cy="3657600"/>
           </a:xfrm>
           <a:prstGeom prst="rect">

</xml_diff>